<commit_message>
Update Week 6 lecture PPT
</commit_message>
<xml_diff>
--- a/Week 6 -- 2D spatial models/Lecture/Lecture 6 -- 2D spatial models.pptx
+++ b/Week 6 -- 2D spatial models/Lecture/Lecture 6 -- 2D spatial models.pptx
@@ -20,7 +20,7 @@
     <p:sldId id="326" r:id="rId11"/>
     <p:sldId id="325" r:id="rId12"/>
     <p:sldId id="327" r:id="rId13"/>
-    <p:sldId id="334" r:id="rId14"/>
+    <p:sldId id="341" r:id="rId14"/>
     <p:sldId id="338" r:id="rId15"/>
     <p:sldId id="340" r:id="rId16"/>
     <p:sldId id="339" r:id="rId17"/>
@@ -212,7 +212,7 @@
           <a:p>
             <a:fld id="{1522831B-4FE3-4D45-950B-0D2C6BB2DD76}" type="datetimeFigureOut">
               <a:rPr lang="en-US" smtClean="0"/>
-              <a:t>5/1/2018</a:t>
+              <a:t>5/8/2018</a:t>
             </a:fld>
             <a:endParaRPr lang="en-US"/>
           </a:p>
@@ -3562,8 +3562,8 @@
           </a:p>
         </p:txBody>
       </p:sp>
-      <mc:AlternateContent xmlns:mc="http://schemas.openxmlformats.org/markup-compatibility/2006" xmlns:a14="http://schemas.microsoft.com/office/drawing/2010/main">
-        <mc:Choice Requires="a14">
+      <mc:AlternateContent xmlns:mc="http://schemas.openxmlformats.org/markup-compatibility/2006">
+        <mc:Choice xmlns:a14="http://schemas.microsoft.com/office/drawing/2010/main" Requires="a14">
           <p:sp>
             <p:nvSpPr>
               <p:cNvPr id="3" name="Content Placeholder 2"/>
@@ -3735,6 +3735,119 @@
                 </a:r>
               </a:p>
               <a:p>
+                <a:pPr marL="457200" lvl="1" indent="0">
+                  <a:buNone/>
+                </a:pPr>
+                <a14:m>
+                  <m:oMathPara xmlns:m="http://schemas.openxmlformats.org/officeDocument/2006/math">
+                    <m:oMathParaPr>
+                      <m:jc m:val="centerGroup"/>
+                    </m:oMathParaPr>
+                    <m:oMath xmlns:m="http://schemas.openxmlformats.org/officeDocument/2006/math">
+                      <m:r>
+                        <a:rPr lang="el-GR" b="1">
+                          <a:latin typeface="Cambria Math" panose="02040503050406030204" pitchFamily="18" charset="0"/>
+                          <a:ea typeface="Cambria Math" panose="02040503050406030204" pitchFamily="18" charset="0"/>
+                        </a:rPr>
+                        <m:t>𝚺</m:t>
+                      </m:r>
+                      <m:r>
+                        <a:rPr lang="en-US" b="1" i="0" smtClean="0">
+                          <a:latin typeface="Cambria Math" panose="02040503050406030204" pitchFamily="18" charset="0"/>
+                          <a:ea typeface="Cambria Math" panose="02040503050406030204" pitchFamily="18" charset="0"/>
+                        </a:rPr>
+                        <m:t>=</m:t>
+                      </m:r>
+                      <m:f>
+                        <m:fPr>
+                          <m:ctrlPr>
+                            <a:rPr lang="en-US" i="1" smtClean="0">
+                              <a:latin typeface="Cambria Math" panose="02040503050406030204" pitchFamily="18" charset="0"/>
+                              <a:ea typeface="Cambria Math" panose="02040503050406030204" pitchFamily="18" charset="0"/>
+                            </a:rPr>
+                          </m:ctrlPr>
+                        </m:fPr>
+                        <m:num>
+                          <m:sSup>
+                            <m:sSupPr>
+                              <m:ctrlPr>
+                                <a:rPr lang="en-US" i="1">
+                                  <a:latin typeface="Cambria Math" panose="02040503050406030204" pitchFamily="18" charset="0"/>
+                                  <a:ea typeface="Cambria Math" panose="02040503050406030204" pitchFamily="18" charset="0"/>
+                                </a:rPr>
+                              </m:ctrlPr>
+                            </m:sSupPr>
+                            <m:e>
+                              <m:r>
+                                <a:rPr lang="en-US" b="0" i="1">
+                                  <a:latin typeface="Cambria Math" panose="02040503050406030204" pitchFamily="18" charset="0"/>
+                                  <a:ea typeface="Cambria Math" panose="02040503050406030204" pitchFamily="18" charset="0"/>
+                                </a:rPr>
+                                <m:t>𝜎</m:t>
+                              </m:r>
+                            </m:e>
+                            <m:sup>
+                              <m:r>
+                                <a:rPr lang="en-US" b="0" i="1">
+                                  <a:latin typeface="Cambria Math" panose="02040503050406030204" pitchFamily="18" charset="0"/>
+                                  <a:ea typeface="Cambria Math" panose="02040503050406030204" pitchFamily="18" charset="0"/>
+                                </a:rPr>
+                                <m:t>2</m:t>
+                              </m:r>
+                            </m:sup>
+                          </m:sSup>
+                        </m:num>
+                        <m:den>
+                          <m:r>
+                            <a:rPr lang="en-US" b="0" i="1" smtClean="0">
+                              <a:latin typeface="Cambria Math" panose="02040503050406030204" pitchFamily="18" charset="0"/>
+                              <a:ea typeface="Cambria Math" panose="02040503050406030204" pitchFamily="18" charset="0"/>
+                            </a:rPr>
+                            <m:t>1−</m:t>
+                          </m:r>
+                          <m:sSup>
+                            <m:sSupPr>
+                              <m:ctrlPr>
+                                <a:rPr lang="en-US" i="1" smtClean="0">
+                                  <a:latin typeface="Cambria Math" panose="02040503050406030204" pitchFamily="18" charset="0"/>
+                                  <a:ea typeface="Cambria Math" panose="02040503050406030204" pitchFamily="18" charset="0"/>
+                                </a:rPr>
+                              </m:ctrlPr>
+                            </m:sSupPr>
+                            <m:e>
+                              <m:r>
+                                <a:rPr lang="en-US" b="0" i="1" smtClean="0">
+                                  <a:latin typeface="Cambria Math" panose="02040503050406030204" pitchFamily="18" charset="0"/>
+                                  <a:ea typeface="Cambria Math" panose="02040503050406030204" pitchFamily="18" charset="0"/>
+                                </a:rPr>
+                                <m:t>𝜌</m:t>
+                              </m:r>
+                            </m:e>
+                            <m:sup>
+                              <m:r>
+                                <a:rPr lang="en-US" b="0" i="1" smtClean="0">
+                                  <a:latin typeface="Cambria Math" panose="02040503050406030204" pitchFamily="18" charset="0"/>
+                                  <a:ea typeface="Cambria Math" panose="02040503050406030204" pitchFamily="18" charset="0"/>
+                                </a:rPr>
+                                <m:t>2</m:t>
+                              </m:r>
+                            </m:sup>
+                          </m:sSup>
+                        </m:den>
+                      </m:f>
+                      <m:r>
+                        <a:rPr lang="en-US" b="1" i="0" smtClean="0">
+                          <a:latin typeface="Cambria Math" panose="02040503050406030204" pitchFamily="18" charset="0"/>
+                          <a:ea typeface="Cambria Math" panose="02040503050406030204" pitchFamily="18" charset="0"/>
+                        </a:rPr>
+                        <m:t>𝐑</m:t>
+                      </m:r>
+                    </m:oMath>
+                  </m:oMathPara>
+                </a14:m>
+                <a:endParaRPr lang="en-US" b="1" dirty="0" smtClean="0"/>
+              </a:p>
+              <a:p>
                 <a:pPr lvl="1"/>
                 <a:endParaRPr lang="en-US" dirty="0"/>
               </a:p>
@@ -3763,7 +3876,7 @@
             </p:txBody>
           </p:sp>
         </mc:Choice>
-        <mc:Fallback xmlns="">
+        <mc:Fallback>
           <p:sp>
             <p:nvSpPr>
               <p:cNvPr id="3" name="Content Placeholder 2"/>
@@ -3806,25 +3919,25 @@
           <p:nvPr>
             <p:extLst>
               <p:ext uri="{D42A27DB-BD31-4B8C-83A1-F6EECF244321}">
-                <p14:modId xmlns:p14="http://schemas.microsoft.com/office/powerpoint/2010/main" val="4137828583"/>
+                <p14:modId xmlns:p14="http://schemas.microsoft.com/office/powerpoint/2010/main" val="4290021282"/>
               </p:ext>
             </p:extLst>
           </p:nvPr>
         </p:nvGraphicFramePr>
         <p:xfrm>
-          <a:off x="2994304" y="2535454"/>
-          <a:ext cx="2557463" cy="1216025"/>
+          <a:off x="3306203" y="3377922"/>
+          <a:ext cx="1949450" cy="1216025"/>
         </p:xfrm>
         <a:graphic>
           <a:graphicData uri="http://schemas.openxmlformats.org/presentationml/2006/ole">
             <mc:AlternateContent xmlns:mc="http://schemas.openxmlformats.org/markup-compatibility/2006">
               <mc:Choice xmlns:v="urn:schemas-microsoft-com:vml" Requires="v">
-                <p:oleObj spid="_x0000_s8216" name="Equation" r:id="rId4" imgW="1549080" imgH="736560" progId="Equation.DSMT4">
+                <p:oleObj spid="_x0000_s8223" name="Equation" r:id="rId4" imgW="1180800" imgH="736560" progId="Equation.DSMT4">
                   <p:embed/>
                 </p:oleObj>
               </mc:Choice>
               <mc:Fallback>
-                <p:oleObj name="Equation" r:id="rId4" imgW="1549080" imgH="736560" progId="Equation.DSMT4">
+                <p:oleObj name="Equation" r:id="rId4" imgW="1180800" imgH="736560" progId="Equation.DSMT4">
                   <p:embed/>
                   <p:pic>
                     <p:nvPicPr>
@@ -3840,8 +3953,8 @@
                     </p:blipFill>
                     <p:spPr>
                       <a:xfrm>
-                        <a:off x="2994304" y="2535454"/>
-                        <a:ext cx="2557463" cy="1216025"/>
+                        <a:off x="3306203" y="3377922"/>
+                        <a:ext cx="1949450" cy="1216025"/>
                       </a:xfrm>
                       <a:prstGeom prst="rect">
                         <a:avLst/>
@@ -3914,8 +4027,8 @@
           </a:p>
         </p:txBody>
       </p:sp>
-      <mc:AlternateContent xmlns:mc="http://schemas.openxmlformats.org/markup-compatibility/2006" xmlns:a14="http://schemas.microsoft.com/office/drawing/2010/main">
-        <mc:Choice Requires="a14">
+      <mc:AlternateContent xmlns:mc="http://schemas.openxmlformats.org/markup-compatibility/2006">
+        <mc:Choice xmlns:a14="http://schemas.microsoft.com/office/drawing/2010/main" Requires="a14">
           <p:sp>
             <p:nvSpPr>
               <p:cNvPr id="3" name="Content Placeholder 2"/>
@@ -4048,8 +4161,186 @@
                 <a:pPr lvl="1"/>
                 <a:r>
                   <a:rPr lang="en-US" dirty="0" smtClean="0"/>
-                  <a:t>where</a:t>
+                  <a:t>Where</a:t>
                 </a:r>
+              </a:p>
+              <a:p>
+                <a:pPr marL="914400" lvl="2" indent="0">
+                  <a:buNone/>
+                </a:pPr>
+                <a14:m>
+                  <m:oMathPara xmlns:m="http://schemas.openxmlformats.org/officeDocument/2006/math">
+                    <m:oMathParaPr>
+                      <m:jc m:val="centerGroup"/>
+                    </m:oMathParaPr>
+                    <m:oMath xmlns:m="http://schemas.openxmlformats.org/officeDocument/2006/math">
+                      <m:sSub>
+                        <m:sSubPr>
+                          <m:ctrlPr>
+                            <a:rPr lang="en-US" b="1" i="1">
+                              <a:latin typeface="Cambria Math" panose="02040503050406030204" pitchFamily="18" charset="0"/>
+                              <a:ea typeface="Cambria Math" panose="02040503050406030204" pitchFamily="18" charset="0"/>
+                            </a:rPr>
+                          </m:ctrlPr>
+                        </m:sSubPr>
+                        <m:e>
+                          <m:r>
+                            <a:rPr lang="el-GR" b="1">
+                              <a:latin typeface="Cambria Math" panose="02040503050406030204" pitchFamily="18" charset="0"/>
+                              <a:ea typeface="Cambria Math" panose="02040503050406030204" pitchFamily="18" charset="0"/>
+                            </a:rPr>
+                            <m:t>𝚺</m:t>
+                          </m:r>
+                        </m:e>
+                        <m:sub>
+                          <m:r>
+                            <m:rPr>
+                              <m:sty m:val="p"/>
+                            </m:rPr>
+                            <a:rPr lang="en-US">
+                              <a:latin typeface="Cambria Math" panose="02040503050406030204" pitchFamily="18" charset="0"/>
+                              <a:ea typeface="Cambria Math" panose="02040503050406030204" pitchFamily="18" charset="0"/>
+                            </a:rPr>
+                            <m:t>total</m:t>
+                          </m:r>
+                        </m:sub>
+                      </m:sSub>
+                      <m:r>
+                        <a:rPr lang="en-US" b="1" i="1" smtClean="0">
+                          <a:latin typeface="Cambria Math" panose="02040503050406030204" pitchFamily="18" charset="0"/>
+                          <a:ea typeface="Cambria Math" panose="02040503050406030204" pitchFamily="18" charset="0"/>
+                        </a:rPr>
+                        <m:t>=</m:t>
+                      </m:r>
+                      <m:f>
+                        <m:fPr>
+                          <m:ctrlPr>
+                            <a:rPr lang="en-US" smtClean="0">
+                              <a:latin typeface="Cambria Math" panose="02040503050406030204" pitchFamily="18" charset="0"/>
+                              <a:ea typeface="Cambria Math" panose="02040503050406030204" pitchFamily="18" charset="0"/>
+                            </a:rPr>
+                          </m:ctrlPr>
+                        </m:fPr>
+                        <m:num>
+                          <m:sSubSup>
+                            <m:sSubSupPr>
+                              <m:ctrlPr>
+                                <a:rPr lang="en-US" smtClean="0">
+                                  <a:latin typeface="Cambria Math" panose="02040503050406030204" pitchFamily="18" charset="0"/>
+                                  <a:ea typeface="Cambria Math" panose="02040503050406030204" pitchFamily="18" charset="0"/>
+                                </a:rPr>
+                              </m:ctrlPr>
+                            </m:sSubSupPr>
+                            <m:e>
+                              <m:r>
+                                <m:rPr>
+                                  <m:sty m:val="p"/>
+                                </m:rPr>
+                                <a:rPr lang="en-US" b="0" i="0" smtClean="0">
+                                  <a:latin typeface="Cambria Math" panose="02040503050406030204" pitchFamily="18" charset="0"/>
+                                  <a:ea typeface="Cambria Math" panose="02040503050406030204" pitchFamily="18" charset="0"/>
+                                </a:rPr>
+                                <m:t>σ</m:t>
+                              </m:r>
+                            </m:e>
+                            <m:sub>
+                              <m:r>
+                                <m:rPr>
+                                  <m:sty m:val="p"/>
+                                </m:rPr>
+                                <a:rPr lang="en-US" b="0" i="0" smtClean="0">
+                                  <a:latin typeface="Cambria Math" panose="02040503050406030204" pitchFamily="18" charset="0"/>
+                                  <a:ea typeface="Cambria Math" panose="02040503050406030204" pitchFamily="18" charset="0"/>
+                                </a:rPr>
+                                <m:t>ε</m:t>
+                              </m:r>
+                            </m:sub>
+                            <m:sup>
+                              <m:r>
+                                <a:rPr lang="en-US" b="0" i="0" smtClean="0">
+                                  <a:latin typeface="Cambria Math" panose="02040503050406030204" pitchFamily="18" charset="0"/>
+                                  <a:ea typeface="Cambria Math" panose="02040503050406030204" pitchFamily="18" charset="0"/>
+                                </a:rPr>
+                                <m:t>2</m:t>
+                              </m:r>
+                            </m:sup>
+                          </m:sSubSup>
+                        </m:num>
+                        <m:den>
+                          <m:r>
+                            <a:rPr lang="en-US" b="0" i="0" smtClean="0">
+                              <a:latin typeface="Cambria Math" panose="02040503050406030204" pitchFamily="18" charset="0"/>
+                              <a:ea typeface="Cambria Math" panose="02040503050406030204" pitchFamily="18" charset="0"/>
+                            </a:rPr>
+                            <m:t>1−</m:t>
+                          </m:r>
+                          <m:sSup>
+                            <m:sSupPr>
+                              <m:ctrlPr>
+                                <a:rPr lang="en-US" smtClean="0">
+                                  <a:latin typeface="Cambria Math" panose="02040503050406030204" pitchFamily="18" charset="0"/>
+                                  <a:ea typeface="Cambria Math" panose="02040503050406030204" pitchFamily="18" charset="0"/>
+                                </a:rPr>
+                              </m:ctrlPr>
+                            </m:sSupPr>
+                            <m:e>
+                              <m:r>
+                                <m:rPr>
+                                  <m:sty m:val="p"/>
+                                </m:rPr>
+                                <a:rPr lang="en-US" b="0" i="0" smtClean="0">
+                                  <a:latin typeface="Cambria Math" panose="02040503050406030204" pitchFamily="18" charset="0"/>
+                                  <a:ea typeface="Cambria Math" panose="02040503050406030204" pitchFamily="18" charset="0"/>
+                                </a:rPr>
+                                <m:t>ρ</m:t>
+                              </m:r>
+                            </m:e>
+                            <m:sup>
+                              <m:r>
+                                <a:rPr lang="en-US" b="0" i="0" smtClean="0">
+                                  <a:latin typeface="Cambria Math" panose="02040503050406030204" pitchFamily="18" charset="0"/>
+                                  <a:ea typeface="Cambria Math" panose="02040503050406030204" pitchFamily="18" charset="0"/>
+                                </a:rPr>
+                                <m:t>2</m:t>
+                              </m:r>
+                            </m:sup>
+                          </m:sSup>
+                        </m:den>
+                      </m:f>
+                      <m:sSub>
+                        <m:sSubPr>
+                          <m:ctrlPr>
+                            <a:rPr lang="en-US" smtClean="0">
+                              <a:latin typeface="Cambria Math" panose="02040503050406030204" pitchFamily="18" charset="0"/>
+                              <a:ea typeface="Cambria Math" panose="02040503050406030204" pitchFamily="18" charset="0"/>
+                            </a:rPr>
+                          </m:ctrlPr>
+                        </m:sSubPr>
+                        <m:e>
+                          <m:r>
+                            <a:rPr lang="en-US" b="1" i="0" smtClean="0">
+                              <a:latin typeface="Cambria Math" panose="02040503050406030204" pitchFamily="18" charset="0"/>
+                              <a:ea typeface="Cambria Math" panose="02040503050406030204" pitchFamily="18" charset="0"/>
+                            </a:rPr>
+                            <m:t>𝐑</m:t>
+                          </m:r>
+                        </m:e>
+                        <m:sub>
+                          <m:r>
+                            <m:rPr>
+                              <m:sty m:val="p"/>
+                            </m:rPr>
+                            <a:rPr lang="en-US" b="0" i="0" smtClean="0">
+                              <a:latin typeface="Cambria Math" panose="02040503050406030204" pitchFamily="18" charset="0"/>
+                              <a:ea typeface="Cambria Math" panose="02040503050406030204" pitchFamily="18" charset="0"/>
+                            </a:rPr>
+                            <m:t>total</m:t>
+                          </m:r>
+                        </m:sub>
+                      </m:sSub>
+                    </m:oMath>
+                  </m:oMathPara>
+                </a14:m>
                 <a:endParaRPr lang="en-US" dirty="0"/>
               </a:p>
               <a:p>
@@ -4059,7 +4350,7 @@
             </p:txBody>
           </p:sp>
         </mc:Choice>
-        <mc:Fallback xmlns="">
+        <mc:Fallback>
           <p:sp>
             <p:nvSpPr>
               <p:cNvPr id="3" name="Content Placeholder 2"/>
@@ -4102,25 +4393,25 @@
           <p:nvPr>
             <p:extLst>
               <p:ext uri="{D42A27DB-BD31-4B8C-83A1-F6EECF244321}">
-                <p14:modId xmlns:p14="http://schemas.microsoft.com/office/powerpoint/2010/main" val="3025915611"/>
+                <p14:modId xmlns:p14="http://schemas.microsoft.com/office/powerpoint/2010/main" val="485505236"/>
               </p:ext>
             </p:extLst>
           </p:nvPr>
         </p:nvGraphicFramePr>
         <p:xfrm>
-          <a:off x="862013" y="2997200"/>
-          <a:ext cx="7273925" cy="3732213"/>
+          <a:off x="1274763" y="3549650"/>
+          <a:ext cx="5754687" cy="3232150"/>
         </p:xfrm>
         <a:graphic>
           <a:graphicData uri="http://schemas.openxmlformats.org/presentationml/2006/ole">
             <mc:AlternateContent xmlns:mc="http://schemas.openxmlformats.org/markup-compatibility/2006">
               <mc:Choice xmlns:v="urn:schemas-microsoft-com:vml" Requires="v">
-                <p:oleObj spid="_x0000_s9240" name="Equation" r:id="rId4" imgW="4406760" imgH="2260440" progId="Equation.DSMT4">
+                <p:oleObj spid="_x0000_s9247" name="Equation" r:id="rId4" imgW="4025880" imgH="2260440" progId="Equation.DSMT4">
                   <p:embed/>
                 </p:oleObj>
               </mc:Choice>
               <mc:Fallback>
-                <p:oleObj name="Equation" r:id="rId4" imgW="4406760" imgH="2260440" progId="Equation.DSMT4">
+                <p:oleObj name="Equation" r:id="rId4" imgW="4025880" imgH="2260440" progId="Equation.DSMT4">
                   <p:embed/>
                   <p:pic>
                     <p:nvPicPr>
@@ -4136,8 +4427,8 @@
                     </p:blipFill>
                     <p:spPr>
                       <a:xfrm>
-                        <a:off x="862013" y="2997200"/>
-                        <a:ext cx="7273925" cy="3732213"/>
+                        <a:off x="1274763" y="3549650"/>
+                        <a:ext cx="5754687" cy="3232150"/>
                       </a:xfrm>
                       <a:prstGeom prst="rect">
                         <a:avLst/>
@@ -4210,8 +4501,8 @@
           </a:p>
         </p:txBody>
       </p:sp>
-      <mc:AlternateContent xmlns:mc="http://schemas.openxmlformats.org/markup-compatibility/2006" xmlns:a14="http://schemas.microsoft.com/office/drawing/2010/main">
-        <mc:Choice Requires="a14">
+      <mc:AlternateContent xmlns:mc="http://schemas.openxmlformats.org/markup-compatibility/2006">
+        <mc:Choice xmlns:a14="http://schemas.microsoft.com/office/drawing/2010/main" Requires="a14">
           <p:sp>
             <p:nvSpPr>
               <p:cNvPr id="3" name="Content Placeholder 2"/>
@@ -4255,10 +4546,13 @@
                     </m:oMathParaPr>
                     <m:oMath xmlns:m="http://schemas.openxmlformats.org/officeDocument/2006/math">
                       <m:r>
-                        <a:rPr lang="en-US" b="0" i="1" smtClean="0">
+                        <m:rPr>
+                          <m:sty m:val="p"/>
+                        </m:rPr>
+                        <a:rPr lang="en-US" b="0" i="0" smtClean="0">
                           <a:latin typeface="Cambria Math" panose="02040503050406030204" pitchFamily="18" charset="0"/>
                         </a:rPr>
-                        <m:t>𝑣𝑒𝑐</m:t>
+                        <m:t>vec</m:t>
                       </m:r>
                       <m:d>
                         <m:dPr>
@@ -4395,12 +4689,105 @@
                         </a:rPr>
                         <m:t>=</m:t>
                       </m:r>
+                      <m:f>
+                        <m:fPr>
+                          <m:ctrlPr>
+                            <a:rPr lang="en-US" b="1" i="1" smtClean="0">
+                              <a:latin typeface="Cambria Math" panose="02040503050406030204" pitchFamily="18" charset="0"/>
+                              <a:ea typeface="Cambria Math" panose="02040503050406030204" pitchFamily="18" charset="0"/>
+                            </a:rPr>
+                          </m:ctrlPr>
+                        </m:fPr>
+                        <m:num>
+                          <m:sSubSup>
+                            <m:sSubSupPr>
+                              <m:ctrlPr>
+                                <a:rPr lang="en-US" i="1" smtClean="0">
+                                  <a:latin typeface="Cambria Math" panose="02040503050406030204" pitchFamily="18" charset="0"/>
+                                  <a:ea typeface="Cambria Math" panose="02040503050406030204" pitchFamily="18" charset="0"/>
+                                </a:rPr>
+                              </m:ctrlPr>
+                            </m:sSubSupPr>
+                            <m:e>
+                              <m:r>
+                                <a:rPr lang="en-US" b="0" i="1" smtClean="0">
+                                  <a:latin typeface="Cambria Math" panose="02040503050406030204" pitchFamily="18" charset="0"/>
+                                  <a:ea typeface="Cambria Math" panose="02040503050406030204" pitchFamily="18" charset="0"/>
+                                </a:rPr>
+                                <m:t>𝜎</m:t>
+                              </m:r>
+                            </m:e>
+                            <m:sub>
+                              <m:r>
+                                <a:rPr lang="en-US" b="0" i="1" smtClean="0">
+                                  <a:latin typeface="Cambria Math" panose="02040503050406030204" pitchFamily="18" charset="0"/>
+                                  <a:ea typeface="Cambria Math" panose="02040503050406030204" pitchFamily="18" charset="0"/>
+                                </a:rPr>
+                                <m:t>𝜀</m:t>
+                              </m:r>
+                            </m:sub>
+                            <m:sup>
+                              <m:r>
+                                <a:rPr lang="en-US" b="0" i="1" smtClean="0">
+                                  <a:latin typeface="Cambria Math" panose="02040503050406030204" pitchFamily="18" charset="0"/>
+                                  <a:ea typeface="Cambria Math" panose="02040503050406030204" pitchFamily="18" charset="0"/>
+                                </a:rPr>
+                                <m:t>2</m:t>
+                              </m:r>
+                            </m:sup>
+                          </m:sSubSup>
+                        </m:num>
+                        <m:den>
+                          <m:r>
+                            <a:rPr lang="en-US" b="0" i="1" smtClean="0">
+                              <a:latin typeface="Cambria Math" panose="02040503050406030204" pitchFamily="18" charset="0"/>
+                              <a:ea typeface="Cambria Math" panose="02040503050406030204" pitchFamily="18" charset="0"/>
+                            </a:rPr>
+                            <m:t>1−</m:t>
+                          </m:r>
+                          <m:sSup>
+                            <m:sSupPr>
+                              <m:ctrlPr>
+                                <a:rPr lang="en-US" i="1" smtClean="0">
+                                  <a:latin typeface="Cambria Math" panose="02040503050406030204" pitchFamily="18" charset="0"/>
+                                  <a:ea typeface="Cambria Math" panose="02040503050406030204" pitchFamily="18" charset="0"/>
+                                </a:rPr>
+                              </m:ctrlPr>
+                            </m:sSupPr>
+                            <m:e>
+                              <m:r>
+                                <a:rPr lang="en-US" b="0" i="1">
+                                  <a:latin typeface="Cambria Math" panose="02040503050406030204" pitchFamily="18" charset="0"/>
+                                  <a:ea typeface="Cambria Math" panose="02040503050406030204" pitchFamily="18" charset="0"/>
+                                </a:rPr>
+                                <m:t>𝜌</m:t>
+                              </m:r>
+                            </m:e>
+                            <m:sup>
+                              <m:r>
+                                <a:rPr lang="en-US" b="0" i="1" smtClean="0">
+                                  <a:latin typeface="Cambria Math" panose="02040503050406030204" pitchFamily="18" charset="0"/>
+                                  <a:ea typeface="Cambria Math" panose="02040503050406030204" pitchFamily="18" charset="0"/>
+                                </a:rPr>
+                                <m:t>2</m:t>
+                              </m:r>
+                            </m:sup>
+                          </m:sSup>
+                        </m:den>
+                      </m:f>
                       <m:r>
-                        <a:rPr lang="el-GR" b="1">
+                        <a:rPr lang="en-US" b="1" i="1" smtClean="0">
                           <a:latin typeface="Cambria Math" panose="02040503050406030204" pitchFamily="18" charset="0"/>
                           <a:ea typeface="Cambria Math" panose="02040503050406030204" pitchFamily="18" charset="0"/>
                         </a:rPr>
-                        <m:t>𝚺</m:t>
+                        <m:t>(</m:t>
+                      </m:r>
+                      <m:r>
+                        <a:rPr lang="en-US" b="1" i="0" smtClean="0">
+                          <a:latin typeface="Cambria Math" panose="02040503050406030204" pitchFamily="18" charset="0"/>
+                          <a:ea typeface="Cambria Math" panose="02040503050406030204" pitchFamily="18" charset="0"/>
+                        </a:rPr>
+                        <m:t>𝐑</m:t>
                       </m:r>
                       <m:r>
                         <a:rPr lang="el-GR" b="1" i="1" smtClean="0">
@@ -4410,11 +4797,18 @@
                         <m:t>⊗</m:t>
                       </m:r>
                       <m:r>
-                        <a:rPr lang="el-GR" b="1">
+                        <a:rPr lang="en-US" b="1" i="0" smtClean="0">
                           <a:latin typeface="Cambria Math" panose="02040503050406030204" pitchFamily="18" charset="0"/>
                           <a:ea typeface="Cambria Math" panose="02040503050406030204" pitchFamily="18" charset="0"/>
                         </a:rPr>
-                        <m:t>𝚺</m:t>
+                        <m:t>𝐑</m:t>
+                      </m:r>
+                      <m:r>
+                        <a:rPr lang="en-US" b="1" i="0" smtClean="0">
+                          <a:latin typeface="Cambria Math" panose="02040503050406030204" pitchFamily="18" charset="0"/>
+                          <a:ea typeface="Cambria Math" panose="02040503050406030204" pitchFamily="18" charset="0"/>
+                        </a:rPr>
+                        <m:t>)</m:t>
                       </m:r>
                     </m:oMath>
                   </m:oMathPara>
@@ -4798,7 +5192,7 @@
             </p:txBody>
           </p:sp>
         </mc:Choice>
-        <mc:Fallback xmlns="">
+        <mc:Fallback>
           <p:sp>
             <p:nvSpPr>
               <p:cNvPr id="3" name="Content Placeholder 2"/>
@@ -4892,8 +5286,8 @@
           </a:p>
         </p:txBody>
       </p:sp>
-      <mc:AlternateContent xmlns:mc="http://schemas.openxmlformats.org/markup-compatibility/2006" xmlns:a14="http://schemas.microsoft.com/office/drawing/2010/main">
-        <mc:Choice Requires="a14">
+      <mc:AlternateContent xmlns:mc="http://schemas.openxmlformats.org/markup-compatibility/2006">
+        <mc:Choice xmlns:a14="http://schemas.microsoft.com/office/drawing/2010/main" Requires="a14">
           <p:sp>
             <p:nvSpPr>
               <p:cNvPr id="3" name="Content Placeholder 2"/>
@@ -4910,7 +5304,7 @@
               <a:lstStyle/>
               <a:p>
                 <a:r>
-                  <a:rPr lang="en-US" dirty="0"/>
+                  <a:rPr lang="en-US" dirty="0" smtClean="0"/>
                   <a:t>Kroenecker product inverse is easy</a:t>
                 </a:r>
               </a:p>
@@ -4935,7 +5329,7 @@
                         </m:sSubSupPr>
                         <m:e>
                           <m:r>
-                            <a:rPr lang="el-GR" b="1">
+                            <a:rPr lang="el-GR" b="1" smtClean="0">
                               <a:latin typeface="Cambria Math" panose="02040503050406030204" pitchFamily="18" charset="0"/>
                               <a:ea typeface="Cambria Math" panose="02040503050406030204" pitchFamily="18" charset="0"/>
                             </a:rPr>
@@ -4988,6 +5382,64 @@
                           </m:ctrlPr>
                         </m:sSupPr>
                         <m:e>
+                          <m:f>
+                            <m:fPr>
+                              <m:ctrlPr>
+                                <a:rPr lang="en-US" i="1" smtClean="0">
+                                  <a:latin typeface="Cambria Math" panose="02040503050406030204" pitchFamily="18" charset="0"/>
+                                  <a:ea typeface="Cambria Math" panose="02040503050406030204" pitchFamily="18" charset="0"/>
+                                </a:rPr>
+                              </m:ctrlPr>
+                            </m:fPr>
+                            <m:num>
+                              <m:r>
+                                <a:rPr lang="en-US" b="0" i="1" smtClean="0">
+                                  <a:latin typeface="Cambria Math" panose="02040503050406030204" pitchFamily="18" charset="0"/>
+                                  <a:ea typeface="Cambria Math" panose="02040503050406030204" pitchFamily="18" charset="0"/>
+                                </a:rPr>
+                                <m:t>1</m:t>
+                              </m:r>
+                            </m:num>
+                            <m:den>
+                              <m:sSubSup>
+                                <m:sSubSupPr>
+                                  <m:ctrlPr>
+                                    <a:rPr lang="en-US" i="1" smtClean="0">
+                                      <a:latin typeface="Cambria Math" panose="02040503050406030204" pitchFamily="18" charset="0"/>
+                                      <a:ea typeface="Cambria Math" panose="02040503050406030204" pitchFamily="18" charset="0"/>
+                                    </a:rPr>
+                                  </m:ctrlPr>
+                                </m:sSubSupPr>
+                                <m:e>
+                                  <m:r>
+                                    <a:rPr lang="en-US" b="0" i="1" smtClean="0">
+                                      <a:latin typeface="Cambria Math" panose="02040503050406030204" pitchFamily="18" charset="0"/>
+                                      <a:ea typeface="Cambria Math" panose="02040503050406030204" pitchFamily="18" charset="0"/>
+                                    </a:rPr>
+                                    <m:t>𝜎</m:t>
+                                  </m:r>
+                                </m:e>
+                                <m:sub>
+                                  <m:r>
+                                    <a:rPr lang="en-US" b="0" i="1" smtClean="0">
+                                      <a:latin typeface="Cambria Math" panose="02040503050406030204" pitchFamily="18" charset="0"/>
+                                      <a:ea typeface="Cambria Math" panose="02040503050406030204" pitchFamily="18" charset="0"/>
+                                    </a:rPr>
+                                    <m:t>𝜀</m:t>
+                                  </m:r>
+                                </m:sub>
+                                <m:sup>
+                                  <m:r>
+                                    <a:rPr lang="en-US" b="0" i="1" smtClean="0">
+                                      <a:latin typeface="Cambria Math" panose="02040503050406030204" pitchFamily="18" charset="0"/>
+                                      <a:ea typeface="Cambria Math" panose="02040503050406030204" pitchFamily="18" charset="0"/>
+                                    </a:rPr>
+                                    <m:t>2</m:t>
+                                  </m:r>
+                                </m:sup>
+                              </m:sSubSup>
+                            </m:den>
+                          </m:f>
                           <m:d>
                             <m:dPr>
                               <m:ctrlPr>
@@ -4999,11 +5451,11 @@
                             </m:dPr>
                             <m:e>
                               <m:r>
-                                <a:rPr lang="el-GR" b="1">
+                                <a:rPr lang="en-US" b="1" i="0" smtClean="0">
                                   <a:latin typeface="Cambria Math" panose="02040503050406030204" pitchFamily="18" charset="0"/>
                                   <a:ea typeface="Cambria Math" panose="02040503050406030204" pitchFamily="18" charset="0"/>
                                 </a:rPr>
-                                <m:t>𝚺</m:t>
+                                <m:t>𝐐</m:t>
                               </m:r>
                               <m:r>
                                 <a:rPr lang="el-GR" b="1" i="1">
@@ -5013,11 +5465,11 @@
                                 <m:t>⊗</m:t>
                               </m:r>
                               <m:r>
-                                <a:rPr lang="el-GR" b="1">
+                                <a:rPr lang="en-US" b="1" i="0" smtClean="0">
                                   <a:latin typeface="Cambria Math" panose="02040503050406030204" pitchFamily="18" charset="0"/>
                                   <a:ea typeface="Cambria Math" panose="02040503050406030204" pitchFamily="18" charset="0"/>
                                 </a:rPr>
-                                <m:t>𝚺</m:t>
+                                <m:t>𝐐</m:t>
                               </m:r>
                             </m:e>
                           </m:d>
@@ -5046,83 +5498,153 @@
                         </a:rPr>
                         <m:t>=</m:t>
                       </m:r>
-                      <m:sSup>
-                        <m:sSupPr>
+                      <m:f>
+                        <m:fPr>
                           <m:ctrlPr>
-                            <a:rPr lang="en-US" b="1" i="1">
+                            <a:rPr lang="en-US" i="1">
                               <a:latin typeface="Cambria Math" panose="02040503050406030204" pitchFamily="18" charset="0"/>
                               <a:ea typeface="Cambria Math" panose="02040503050406030204" pitchFamily="18" charset="0"/>
                             </a:rPr>
                           </m:ctrlPr>
-                        </m:sSupPr>
-                        <m:e>
+                        </m:fPr>
+                        <m:num>
                           <m:r>
-                            <a:rPr lang="el-GR" b="1">
+                            <a:rPr lang="en-US" i="1">
                               <a:latin typeface="Cambria Math" panose="02040503050406030204" pitchFamily="18" charset="0"/>
                               <a:ea typeface="Cambria Math" panose="02040503050406030204" pitchFamily="18" charset="0"/>
                             </a:rPr>
-                            <m:t>𝚺</m:t>
+                            <m:t>1</m:t>
                           </m:r>
-                        </m:e>
-                        <m:sup>
-                          <m:r>
-                            <a:rPr lang="en-US" b="1">
-                              <a:latin typeface="Cambria Math" panose="02040503050406030204" pitchFamily="18" charset="0"/>
-                              <a:ea typeface="Cambria Math" panose="02040503050406030204" pitchFamily="18" charset="0"/>
-                            </a:rPr>
-                            <m:t>−</m:t>
-                          </m:r>
-                          <m:r>
-                            <a:rPr lang="en-US" b="1">
-                              <a:latin typeface="Cambria Math" panose="02040503050406030204" pitchFamily="18" charset="0"/>
-                              <a:ea typeface="Cambria Math" panose="02040503050406030204" pitchFamily="18" charset="0"/>
-                            </a:rPr>
-                            <m:t>𝟏</m:t>
-                          </m:r>
-                        </m:sup>
-                      </m:sSup>
-                      <m:r>
-                        <a:rPr lang="el-GR" b="1" i="1">
-                          <a:latin typeface="Cambria Math" panose="02040503050406030204" pitchFamily="18" charset="0"/>
-                          <a:ea typeface="Cambria Math" panose="02040503050406030204" pitchFamily="18" charset="0"/>
-                        </a:rPr>
-                        <m:t>⊗</m:t>
-                      </m:r>
-                      <m:sSup>
-                        <m:sSupPr>
+                        </m:num>
+                        <m:den>
+                          <m:sSubSup>
+                            <m:sSubSupPr>
+                              <m:ctrlPr>
+                                <a:rPr lang="en-US" i="1">
+                                  <a:latin typeface="Cambria Math" panose="02040503050406030204" pitchFamily="18" charset="0"/>
+                                  <a:ea typeface="Cambria Math" panose="02040503050406030204" pitchFamily="18" charset="0"/>
+                                </a:rPr>
+                              </m:ctrlPr>
+                            </m:sSubSupPr>
+                            <m:e>
+                              <m:r>
+                                <a:rPr lang="en-US" i="1">
+                                  <a:latin typeface="Cambria Math" panose="02040503050406030204" pitchFamily="18" charset="0"/>
+                                  <a:ea typeface="Cambria Math" panose="02040503050406030204" pitchFamily="18" charset="0"/>
+                                </a:rPr>
+                                <m:t>𝜎</m:t>
+                              </m:r>
+                            </m:e>
+                            <m:sub>
+                              <m:r>
+                                <a:rPr lang="en-US" i="1">
+                                  <a:latin typeface="Cambria Math" panose="02040503050406030204" pitchFamily="18" charset="0"/>
+                                  <a:ea typeface="Cambria Math" panose="02040503050406030204" pitchFamily="18" charset="0"/>
+                                </a:rPr>
+                                <m:t>𝜀</m:t>
+                              </m:r>
+                            </m:sub>
+                            <m:sup>
+                              <m:r>
+                                <a:rPr lang="en-US" i="1">
+                                  <a:latin typeface="Cambria Math" panose="02040503050406030204" pitchFamily="18" charset="0"/>
+                                  <a:ea typeface="Cambria Math" panose="02040503050406030204" pitchFamily="18" charset="0"/>
+                                </a:rPr>
+                                <m:t>2</m:t>
+                              </m:r>
+                            </m:sup>
+                          </m:sSubSup>
+                        </m:den>
+                      </m:f>
+                      <m:d>
+                        <m:dPr>
                           <m:ctrlPr>
-                            <a:rPr lang="en-US" b="1" i="1">
+                            <a:rPr lang="en-US" b="1" i="1" smtClean="0">
                               <a:latin typeface="Cambria Math" panose="02040503050406030204" pitchFamily="18" charset="0"/>
                               <a:ea typeface="Cambria Math" panose="02040503050406030204" pitchFamily="18" charset="0"/>
                             </a:rPr>
                           </m:ctrlPr>
-                        </m:sSupPr>
+                        </m:dPr>
                         <m:e>
+                          <m:sSup>
+                            <m:sSupPr>
+                              <m:ctrlPr>
+                                <a:rPr lang="en-US" b="1" i="1">
+                                  <a:latin typeface="Cambria Math" panose="02040503050406030204" pitchFamily="18" charset="0"/>
+                                  <a:ea typeface="Cambria Math" panose="02040503050406030204" pitchFamily="18" charset="0"/>
+                                </a:rPr>
+                              </m:ctrlPr>
+                            </m:sSupPr>
+                            <m:e>
+                              <m:r>
+                                <a:rPr lang="en-US" b="1" i="0" smtClean="0">
+                                  <a:latin typeface="Cambria Math" panose="02040503050406030204" pitchFamily="18" charset="0"/>
+                                  <a:ea typeface="Cambria Math" panose="02040503050406030204" pitchFamily="18" charset="0"/>
+                                </a:rPr>
+                                <m:t>𝐐</m:t>
+                              </m:r>
+                            </m:e>
+                            <m:sup>
+                              <m:r>
+                                <a:rPr lang="en-US" b="1">
+                                  <a:latin typeface="Cambria Math" panose="02040503050406030204" pitchFamily="18" charset="0"/>
+                                  <a:ea typeface="Cambria Math" panose="02040503050406030204" pitchFamily="18" charset="0"/>
+                                </a:rPr>
+                                <m:t>−</m:t>
+                              </m:r>
+                              <m:r>
+                                <a:rPr lang="en-US" b="1">
+                                  <a:latin typeface="Cambria Math" panose="02040503050406030204" pitchFamily="18" charset="0"/>
+                                  <a:ea typeface="Cambria Math" panose="02040503050406030204" pitchFamily="18" charset="0"/>
+                                </a:rPr>
+                                <m:t>𝟏</m:t>
+                              </m:r>
+                            </m:sup>
+                          </m:sSup>
                           <m:r>
-                            <a:rPr lang="el-GR" b="1">
+                            <a:rPr lang="el-GR" b="1" i="1">
                               <a:latin typeface="Cambria Math" panose="02040503050406030204" pitchFamily="18" charset="0"/>
                               <a:ea typeface="Cambria Math" panose="02040503050406030204" pitchFamily="18" charset="0"/>
                             </a:rPr>
-                            <m:t>𝚺</m:t>
+                            <m:t>⊗</m:t>
                           </m:r>
+                          <m:sSup>
+                            <m:sSupPr>
+                              <m:ctrlPr>
+                                <a:rPr lang="en-US" b="1" i="1">
+                                  <a:latin typeface="Cambria Math" panose="02040503050406030204" pitchFamily="18" charset="0"/>
+                                  <a:ea typeface="Cambria Math" panose="02040503050406030204" pitchFamily="18" charset="0"/>
+                                </a:rPr>
+                              </m:ctrlPr>
+                            </m:sSupPr>
+                            <m:e>
+                              <m:r>
+                                <a:rPr lang="en-US" b="1" i="0" smtClean="0">
+                                  <a:latin typeface="Cambria Math" panose="02040503050406030204" pitchFamily="18" charset="0"/>
+                                  <a:ea typeface="Cambria Math" panose="02040503050406030204" pitchFamily="18" charset="0"/>
+                                </a:rPr>
+                                <m:t>𝐐</m:t>
+                              </m:r>
+                            </m:e>
+                            <m:sup>
+                              <m:r>
+                                <a:rPr lang="en-US" b="1">
+                                  <a:latin typeface="Cambria Math" panose="02040503050406030204" pitchFamily="18" charset="0"/>
+                                  <a:ea typeface="Cambria Math" panose="02040503050406030204" pitchFamily="18" charset="0"/>
+                                </a:rPr>
+                                <m:t>−</m:t>
+                              </m:r>
+                              <m:r>
+                                <a:rPr lang="en-US" b="1">
+                                  <a:latin typeface="Cambria Math" panose="02040503050406030204" pitchFamily="18" charset="0"/>
+                                  <a:ea typeface="Cambria Math" panose="02040503050406030204" pitchFamily="18" charset="0"/>
+                                </a:rPr>
+                                <m:t>𝟏</m:t>
+                              </m:r>
+                            </m:sup>
+                          </m:sSup>
                         </m:e>
-                        <m:sup>
-                          <m:r>
-                            <a:rPr lang="en-US" b="1">
-                              <a:latin typeface="Cambria Math" panose="02040503050406030204" pitchFamily="18" charset="0"/>
-                              <a:ea typeface="Cambria Math" panose="02040503050406030204" pitchFamily="18" charset="0"/>
-                            </a:rPr>
-                            <m:t>−</m:t>
-                          </m:r>
-                          <m:r>
-                            <a:rPr lang="en-US" b="1">
-                              <a:latin typeface="Cambria Math" panose="02040503050406030204" pitchFamily="18" charset="0"/>
-                              <a:ea typeface="Cambria Math" panose="02040503050406030204" pitchFamily="18" charset="0"/>
-                            </a:rPr>
-                            <m:t>𝟏</m:t>
-                          </m:r>
-                        </m:sup>
-                      </m:sSup>
+                      </m:d>
                     </m:oMath>
                   </m:oMathPara>
                 </a14:m>
@@ -5150,7 +5672,13 @@
                   <a:rPr lang="en-US" dirty="0">
                     <a:ea typeface="Cambria Math" panose="02040503050406030204" pitchFamily="18" charset="0"/>
                   </a:rPr>
-                  <a:t>know how to calculate </a:t>
+                  <a:t>know how to </a:t>
+                </a:r>
+                <a:r>
+                  <a:rPr lang="en-US" dirty="0" smtClean="0">
+                    <a:ea typeface="Cambria Math" panose="02040503050406030204" pitchFamily="18" charset="0"/>
+                  </a:rPr>
+                  <a:t>calculate </a:t>
                 </a:r>
                 <a14:m>
                   <m:oMath xmlns:m="http://schemas.openxmlformats.org/officeDocument/2006/math">
@@ -5165,11 +5693,11 @@
                       </m:sSupPr>
                       <m:e>
                         <m:r>
-                          <a:rPr lang="el-GR" b="1">
+                          <a:rPr lang="en-US" b="1">
                             <a:latin typeface="Cambria Math" panose="02040503050406030204" pitchFamily="18" charset="0"/>
                             <a:ea typeface="Cambria Math" panose="02040503050406030204" pitchFamily="18" charset="0"/>
                           </a:rPr>
-                          <m:t>𝚺</m:t>
+                          <m:t>𝐐</m:t>
                         </m:r>
                       </m:e>
                       <m:sup>
@@ -5220,7 +5748,7 @@
             </p:txBody>
           </p:sp>
         </mc:Choice>
-        <mc:Fallback xmlns="">
+        <mc:Fallback>
           <p:sp>
             <p:nvSpPr>
               <p:cNvPr id="3" name="Content Placeholder 2"/>
@@ -5263,20 +5791,20 @@
           <p:nvPr>
             <p:extLst>
               <p:ext uri="{D42A27DB-BD31-4B8C-83A1-F6EECF244321}">
-                <p14:modId xmlns:p14="http://schemas.microsoft.com/office/powerpoint/2010/main" val="2006351930"/>
+                <p14:modId xmlns:p14="http://schemas.microsoft.com/office/powerpoint/2010/main" val="2495848436"/>
               </p:ext>
             </p:extLst>
           </p:nvPr>
         </p:nvGraphicFramePr>
         <p:xfrm>
-          <a:off x="76200" y="3774222"/>
-          <a:ext cx="8961281" cy="3007578"/>
+          <a:off x="466165" y="4145800"/>
+          <a:ext cx="7854140" cy="2636000"/>
         </p:xfrm>
         <a:graphic>
           <a:graphicData uri="http://schemas.openxmlformats.org/presentationml/2006/ole">
             <mc:AlternateContent xmlns:mc="http://schemas.openxmlformats.org/markup-compatibility/2006">
               <mc:Choice xmlns:v="urn:schemas-microsoft-com:vml" Requires="v">
-                <p:oleObj spid="_x0000_s10284" name="Equation" r:id="rId4" imgW="6730920" imgH="2260440" progId="Equation.DSMT4">
+                <p:oleObj spid="_x0000_s11270" name="Equation" r:id="rId4" imgW="6730920" imgH="2260440" progId="Equation.DSMT4">
                   <p:embed/>
                 </p:oleObj>
               </mc:Choice>
@@ -5297,8 +5825,8 @@
                     </p:blipFill>
                     <p:spPr>
                       <a:xfrm>
-                        <a:off x="76200" y="3774222"/>
-                        <a:ext cx="8961281" cy="3007578"/>
+                        <a:off x="466165" y="4145800"/>
+                        <a:ext cx="7854140" cy="2636000"/>
                       </a:xfrm>
                       <a:prstGeom prst="rect">
                         <a:avLst/>
@@ -5320,29 +5848,29 @@
           <p:nvPr>
             <p:extLst>
               <p:ext uri="{D42A27DB-BD31-4B8C-83A1-F6EECF244321}">
-                <p14:modId xmlns:p14="http://schemas.microsoft.com/office/powerpoint/2010/main" val="1950798000"/>
+                <p14:modId xmlns:p14="http://schemas.microsoft.com/office/powerpoint/2010/main" val="855716342"/>
               </p:ext>
             </p:extLst>
           </p:nvPr>
         </p:nvGraphicFramePr>
         <p:xfrm>
-          <a:off x="2614194" y="2459038"/>
-          <a:ext cx="3519487" cy="1214437"/>
+          <a:off x="2696509" y="2931363"/>
+          <a:ext cx="3121025" cy="1214437"/>
         </p:xfrm>
         <a:graphic>
           <a:graphicData uri="http://schemas.openxmlformats.org/presentationml/2006/ole">
             <mc:AlternateContent xmlns:mc="http://schemas.openxmlformats.org/markup-compatibility/2006">
               <mc:Choice xmlns:v="urn:schemas-microsoft-com:vml" Requires="v">
-                <p:oleObj spid="_x0000_s10285" name="Equation" r:id="rId6" imgW="2133360" imgH="736560" progId="Equation.DSMT4">
+                <p:oleObj spid="_x0000_s11271" name="Equation" r:id="rId6" imgW="1892160" imgH="736560" progId="Equation.DSMT4">
                   <p:embed/>
                 </p:oleObj>
               </mc:Choice>
               <mc:Fallback>
-                <p:oleObj name="Equation" r:id="rId6" imgW="2133360" imgH="736560" progId="Equation.DSMT4">
+                <p:oleObj name="Equation" r:id="rId6" imgW="1892160" imgH="736560" progId="Equation.DSMT4">
                   <p:embed/>
                   <p:pic>
                     <p:nvPicPr>
-                      <p:cNvPr id="4" name="Object 3"/>
+                      <p:cNvPr id="5" name="Object 4"/>
                       <p:cNvPicPr/>
                       <p:nvPr/>
                     </p:nvPicPr>
@@ -5354,8 +5882,8 @@
                     </p:blipFill>
                     <p:spPr>
                       <a:xfrm>
-                        <a:off x="2614194" y="2459038"/>
-                        <a:ext cx="3519487" cy="1214437"/>
+                        <a:off x="2696509" y="2931363"/>
+                        <a:ext cx="3121025" cy="1214437"/>
                       </a:xfrm>
                       <a:prstGeom prst="rect">
                         <a:avLst/>
@@ -5371,7 +5899,7 @@
     </p:spTree>
     <p:extLst>
       <p:ext uri="{BB962C8B-B14F-4D97-AF65-F5344CB8AC3E}">
-        <p14:creationId xmlns:p14="http://schemas.microsoft.com/office/powerpoint/2010/main" val="500771300"/>
+        <p14:creationId xmlns:p14="http://schemas.microsoft.com/office/powerpoint/2010/main" val="2993600492"/>
       </p:ext>
     </p:extLst>
   </p:cSld>
@@ -6386,8 +6914,8 @@
           </a:p>
         </p:txBody>
       </p:sp>
-      <mc:AlternateContent xmlns:mc="http://schemas.openxmlformats.org/markup-compatibility/2006">
-        <mc:Choice xmlns:a14="http://schemas.microsoft.com/office/drawing/2010/main" Requires="a14">
+      <mc:AlternateContent xmlns:mc="http://schemas.openxmlformats.org/markup-compatibility/2006" xmlns:a14="http://schemas.microsoft.com/office/drawing/2010/main">
+        <mc:Choice Requires="a14">
           <p:sp>
             <p:nvSpPr>
               <p:cNvPr id="3" name="Content Placeholder 2"/>
@@ -6424,11 +6952,7 @@
                 </a:pPr>
                 <a:r>
                   <a:rPr lang="en-US" dirty="0" smtClean="0"/>
-                  <a:t>Modify </a:t>
-                </a:r>
-                <a:r>
-                  <a:rPr lang="en-US" dirty="0" smtClean="0"/>
-                  <a:t>code to avoid using </a:t>
+                  <a:t>Modify code to avoid using </a:t>
                 </a:r>
                 <a:r>
                   <a:rPr lang="en-US" dirty="0" err="1" smtClean="0"/>
@@ -6686,7 +7210,7 @@
             </p:txBody>
           </p:sp>
         </mc:Choice>
-        <mc:Fallback>
+        <mc:Fallback xmlns="">
           <p:sp>
             <p:nvSpPr>
               <p:cNvPr id="3" name="Content Placeholder 2"/>
@@ -6730,6 +7254,13 @@
   <p:clrMapOvr>
     <a:masterClrMapping/>
   </p:clrMapOvr>
+  <p:timing>
+    <p:tnLst>
+      <p:par>
+        <p:cTn id="1" dur="indefinite" restart="never" nodeType="tmRoot"/>
+      </p:par>
+    </p:tnLst>
+  </p:timing>
 </p:sld>
 </file>
 
@@ -7405,7 +7936,7 @@
             <a:pPr lvl="2"/>
             <a:r>
               <a:rPr lang="en-US" dirty="0" smtClean="0"/>
-              <a:t>Distribution is a product of niche, dispersal ability, and species interactions</a:t>
+              <a:t>Assumes distribution is a product of habitat variables that are measurable and whose action is local </a:t>
             </a:r>
             <a:endParaRPr lang="en-US" dirty="0"/>
           </a:p>
@@ -8623,8 +9154,8 @@
           </a:p>
         </p:txBody>
       </p:sp>
-      <mc:AlternateContent xmlns:mc="http://schemas.openxmlformats.org/markup-compatibility/2006" xmlns:a14="http://schemas.microsoft.com/office/drawing/2010/main">
-        <mc:Choice Requires="a14">
+      <mc:AlternateContent xmlns:mc="http://schemas.openxmlformats.org/markup-compatibility/2006">
+        <mc:Choice xmlns:a14="http://schemas.microsoft.com/office/drawing/2010/main" Requires="a14">
           <p:sp>
             <p:nvSpPr>
               <p:cNvPr id="3" name="Content Placeholder 2"/>
@@ -8729,11 +9260,11 @@
                         <m:t>(</m:t>
                       </m:r>
                       <m:r>
-                        <a:rPr lang="en-US" i="1">
+                        <a:rPr lang="en-US" b="0" i="1" smtClean="0">
                           <a:latin typeface="Cambria Math" panose="02040503050406030204" pitchFamily="18" charset="0"/>
                           <a:ea typeface="Cambria Math" panose="02040503050406030204" pitchFamily="18" charset="0"/>
                         </a:rPr>
-                        <m:t>𝜌</m:t>
+                        <m:t>𝑐</m:t>
                       </m:r>
                       <m:sSub>
                         <m:sSubPr>
@@ -8886,9 +9417,13 @@
               <a:p>
                 <a:pPr lvl="1"/>
                 <a:r>
-                  <a:rPr lang="en-US" dirty="0"/>
-                  <a:t>where</a:t>
+                  <a:rPr lang="en-US" dirty="0" smtClean="0"/>
+                  <a:t>Where</a:t>
                 </a:r>
+              </a:p>
+              <a:p>
+                <a:pPr lvl="1"/>
+                <a:endParaRPr lang="en-US" dirty="0"/>
               </a:p>
               <a:p>
                 <a:pPr marL="0" indent="0">
@@ -8899,7 +9434,7 @@
             </p:txBody>
           </p:sp>
         </mc:Choice>
-        <mc:Fallback xmlns="">
+        <mc:Fallback>
           <p:sp>
             <p:nvSpPr>
               <p:cNvPr id="3" name="Content Placeholder 2"/>
@@ -8942,25 +9477,25 @@
           <p:nvPr>
             <p:extLst>
               <p:ext uri="{D42A27DB-BD31-4B8C-83A1-F6EECF244321}">
-                <p14:modId xmlns:p14="http://schemas.microsoft.com/office/powerpoint/2010/main" val="3934984020"/>
+                <p14:modId xmlns:p14="http://schemas.microsoft.com/office/powerpoint/2010/main" val="2729456023"/>
               </p:ext>
             </p:extLst>
           </p:nvPr>
         </p:nvGraphicFramePr>
         <p:xfrm>
-          <a:off x="2491346" y="4047620"/>
-          <a:ext cx="2557463" cy="1216025"/>
+          <a:off x="1243013" y="5264150"/>
+          <a:ext cx="1949450" cy="1216025"/>
         </p:xfrm>
         <a:graphic>
           <a:graphicData uri="http://schemas.openxmlformats.org/presentationml/2006/ole">
             <mc:AlternateContent xmlns:mc="http://schemas.openxmlformats.org/markup-compatibility/2006">
               <mc:Choice xmlns:v="urn:schemas-microsoft-com:vml" Requires="v">
-                <p:oleObj spid="_x0000_s7202" name="Equation" r:id="rId4" imgW="1549080" imgH="736560" progId="Equation.DSMT4">
+                <p:oleObj spid="_x0000_s7218" name="Equation" r:id="rId4" imgW="1180800" imgH="736560" progId="Equation.DSMT4">
                   <p:embed/>
                 </p:oleObj>
               </mc:Choice>
               <mc:Fallback>
-                <p:oleObj name="Equation" r:id="rId4" imgW="1549080" imgH="736560" progId="Equation.DSMT4">
+                <p:oleObj name="Equation" r:id="rId4" imgW="1180800" imgH="736560" progId="Equation.DSMT4">
                   <p:embed/>
                   <p:pic>
                     <p:nvPicPr>
@@ -8976,8 +9511,8 @@
                     </p:blipFill>
                     <p:spPr>
                       <a:xfrm>
-                        <a:off x="2491346" y="4047620"/>
-                        <a:ext cx="2557463" cy="1216025"/>
+                        <a:off x="1243013" y="5264150"/>
+                        <a:ext cx="1949450" cy="1216025"/>
                       </a:xfrm>
                       <a:prstGeom prst="rect">
                         <a:avLst/>
@@ -8999,25 +9534,25 @@
           <p:nvPr>
             <p:extLst>
               <p:ext uri="{D42A27DB-BD31-4B8C-83A1-F6EECF244321}">
-                <p14:modId xmlns:p14="http://schemas.microsoft.com/office/powerpoint/2010/main" val="958788817"/>
+                <p14:modId xmlns:p14="http://schemas.microsoft.com/office/powerpoint/2010/main" val="3372254944"/>
               </p:ext>
             </p:extLst>
           </p:nvPr>
         </p:nvGraphicFramePr>
         <p:xfrm>
-          <a:off x="2491346" y="5415504"/>
-          <a:ext cx="3519487" cy="1214437"/>
+          <a:off x="4770438" y="5264150"/>
+          <a:ext cx="3122612" cy="1214438"/>
         </p:xfrm>
         <a:graphic>
           <a:graphicData uri="http://schemas.openxmlformats.org/presentationml/2006/ole">
             <mc:AlternateContent xmlns:mc="http://schemas.openxmlformats.org/markup-compatibility/2006">
               <mc:Choice xmlns:v="urn:schemas-microsoft-com:vml" Requires="v">
-                <p:oleObj spid="_x0000_s7203" name="Equation" r:id="rId6" imgW="2133360" imgH="736560" progId="Equation.DSMT4">
+                <p:oleObj spid="_x0000_s7219" name="Equation" r:id="rId6" imgW="1892160" imgH="736560" progId="Equation.DSMT4">
                   <p:embed/>
                 </p:oleObj>
               </mc:Choice>
               <mc:Fallback>
-                <p:oleObj name="Equation" r:id="rId6" imgW="2133360" imgH="736560" progId="Equation.DSMT4">
+                <p:oleObj name="Equation" r:id="rId6" imgW="1892160" imgH="736560" progId="Equation.DSMT4">
                   <p:embed/>
                   <p:pic>
                     <p:nvPicPr>
@@ -9033,8 +9568,122 @@
                     </p:blipFill>
                     <p:spPr>
                       <a:xfrm>
-                        <a:off x="2491346" y="5415504"/>
-                        <a:ext cx="3519487" cy="1214437"/>
+                        <a:off x="4770438" y="5264150"/>
+                        <a:ext cx="3122612" cy="1214438"/>
+                      </a:xfrm>
+                      <a:prstGeom prst="rect">
+                        <a:avLst/>
+                      </a:prstGeom>
+                    </p:spPr>
+                  </p:pic>
+                </p:oleObj>
+              </mc:Fallback>
+            </mc:AlternateContent>
+          </a:graphicData>
+        </a:graphic>
+      </p:graphicFrame>
+      <p:graphicFrame>
+        <p:nvGraphicFramePr>
+          <p:cNvPr id="6" name="Object 5"/>
+          <p:cNvGraphicFramePr>
+            <a:graphicFrameLocks noChangeAspect="1"/>
+          </p:cNvGraphicFramePr>
+          <p:nvPr>
+            <p:extLst>
+              <p:ext uri="{D42A27DB-BD31-4B8C-83A1-F6EECF244321}">
+                <p14:modId xmlns:p14="http://schemas.microsoft.com/office/powerpoint/2010/main" val="2402055398"/>
+              </p:ext>
+            </p:extLst>
+          </p:nvPr>
+        </p:nvGraphicFramePr>
+        <p:xfrm>
+          <a:off x="1645631" y="4349657"/>
+          <a:ext cx="1341437" cy="733425"/>
+        </p:xfrm>
+        <a:graphic>
+          <a:graphicData uri="http://schemas.openxmlformats.org/presentationml/2006/ole">
+            <mc:AlternateContent xmlns:mc="http://schemas.openxmlformats.org/markup-compatibility/2006">
+              <mc:Choice xmlns:v="urn:schemas-microsoft-com:vml" Requires="v">
+                <p:oleObj spid="_x0000_s7220" name="Equation" r:id="rId8" imgW="812520" imgH="444240" progId="Equation.DSMT4">
+                  <p:embed/>
+                </p:oleObj>
+              </mc:Choice>
+              <mc:Fallback>
+                <p:oleObj name="Equation" r:id="rId8" imgW="812520" imgH="444240" progId="Equation.DSMT4">
+                  <p:embed/>
+                  <p:pic>
+                    <p:nvPicPr>
+                      <p:cNvPr id="4" name="Object 3"/>
+                      <p:cNvPicPr/>
+                      <p:nvPr/>
+                    </p:nvPicPr>
+                    <p:blipFill>
+                      <a:blip r:embed="rId9"/>
+                      <a:stretch>
+                        <a:fillRect/>
+                      </a:stretch>
+                    </p:blipFill>
+                    <p:spPr>
+                      <a:xfrm>
+                        <a:off x="1645631" y="4349657"/>
+                        <a:ext cx="1341437" cy="733425"/>
+                      </a:xfrm>
+                      <a:prstGeom prst="rect">
+                        <a:avLst/>
+                      </a:prstGeom>
+                    </p:spPr>
+                  </p:pic>
+                </p:oleObj>
+              </mc:Fallback>
+            </mc:AlternateContent>
+          </a:graphicData>
+        </a:graphic>
+      </p:graphicFrame>
+      <p:graphicFrame>
+        <p:nvGraphicFramePr>
+          <p:cNvPr id="7" name="Object 6"/>
+          <p:cNvGraphicFramePr>
+            <a:graphicFrameLocks noChangeAspect="1"/>
+          </p:cNvGraphicFramePr>
+          <p:nvPr>
+            <p:extLst>
+              <p:ext uri="{D42A27DB-BD31-4B8C-83A1-F6EECF244321}">
+                <p14:modId xmlns:p14="http://schemas.microsoft.com/office/powerpoint/2010/main" val="2899174242"/>
+              </p:ext>
+            </p:extLst>
+          </p:nvPr>
+        </p:nvGraphicFramePr>
+        <p:xfrm>
+          <a:off x="5608638" y="4370294"/>
+          <a:ext cx="1446212" cy="712788"/>
+        </p:xfrm>
+        <a:graphic>
+          <a:graphicData uri="http://schemas.openxmlformats.org/presentationml/2006/ole">
+            <mc:AlternateContent xmlns:mc="http://schemas.openxmlformats.org/markup-compatibility/2006">
+              <mc:Choice xmlns:v="urn:schemas-microsoft-com:vml" Requires="v">
+                <p:oleObj spid="_x0000_s7221" name="Equation" r:id="rId10" imgW="876240" imgH="431640" progId="Equation.DSMT4">
+                  <p:embed/>
+                </p:oleObj>
+              </mc:Choice>
+              <mc:Fallback>
+                <p:oleObj name="Equation" r:id="rId10" imgW="876240" imgH="431640" progId="Equation.DSMT4">
+                  <p:embed/>
+                  <p:pic>
+                    <p:nvPicPr>
+                      <p:cNvPr id="6" name="Object 5"/>
+                      <p:cNvPicPr/>
+                      <p:nvPr/>
+                    </p:nvPicPr>
+                    <p:blipFill>
+                      <a:blip r:embed="rId11"/>
+                      <a:stretch>
+                        <a:fillRect/>
+                      </a:stretch>
+                    </p:blipFill>
+                    <p:spPr>
+                      <a:xfrm>
+                        <a:off x="5608638" y="4370294"/>
+                        <a:ext cx="1446212" cy="712788"/>
                       </a:xfrm>
                       <a:prstGeom prst="rect">
                         <a:avLst/>

</xml_diff>